<commit_message>
Edited content on presentation
</commit_message>
<xml_diff>
--- a/project-presentation.pptx
+++ b/project-presentation.pptx
@@ -19812,39 +19812,6 @@
           </a:p>
         </p:txBody>
       </p:sp>
-      <p:sp>
-        <p:nvSpPr>
-          <p:cNvPr id="3" name="Content Placeholder 2">
-            <a:extLst>
-              <a:ext uri="{FF2B5EF4-FFF2-40B4-BE49-F238E27FC236}">
-                <a16:creationId xmlns:a16="http://schemas.microsoft.com/office/drawing/2014/main" id="{65ADB5E6-B409-4DC6-A6BD-4CDB7349C1DD}"/>
-              </a:ext>
-            </a:extLst>
-          </p:cNvPr>
-          <p:cNvSpPr>
-            <a:spLocks noGrp="1"/>
-          </p:cNvSpPr>
-          <p:nvPr>
-            <p:ph sz="half" idx="1"/>
-          </p:nvPr>
-        </p:nvSpPr>
-        <p:spPr>
-          <a:xfrm>
-            <a:off x="432000" y="1008000"/>
-            <a:ext cx="4208239" cy="360000"/>
-          </a:xfrm>
-        </p:spPr>
-        <p:txBody>
-          <a:bodyPr/>
-          <a:lstStyle/>
-          <a:p>
-            <a:r>
-              <a:rPr lang="en-US" dirty="0"/>
-              <a:t>There is an opportunity for success</a:t>
-            </a:r>
-          </a:p>
-        </p:txBody>
-      </p:sp>
       <p:pic>
         <p:nvPicPr>
           <p:cNvPr id="38" name="Graphic 37" descr="Mathematics">
@@ -19991,7 +19958,7 @@
         </p:blipFill>
         <p:spPr>
           <a:xfrm>
-            <a:off x="8051155" y="5418353"/>
+            <a:off x="8126968" y="5343098"/>
             <a:ext cx="962986" cy="962986"/>
           </a:xfrm>
           <a:prstGeom prst="rect">
@@ -23119,6 +23086,19 @@
                 </a:solidFill>
               </a:rPr>
               <a:t>Add new form for user to select &amp; submit attributes of prospects who aren’t in the dataset to predict cross-sale potential</a:t>
+            </a:r>
+          </a:p>
+          <a:p>
+            <a:r>
+              <a:rPr lang="en-US" sz="2400" dirty="0">
+                <a:solidFill>
+                  <a:schemeClr val="tx1">
+                    <a:lumMod val="75000"/>
+                    <a:lumOff val="25000"/>
+                  </a:schemeClr>
+                </a:solidFill>
+              </a:rPr>
+              <a:t>Automate the selection of customer ID when customer dials in</a:t>
             </a:r>
           </a:p>
         </p:txBody>
@@ -28614,6 +28594,23 @@
 </file>
 
 <file path=customXml/item1.xml><?xml version="1.0" encoding="utf-8"?>
+<p:properties xmlns:p="http://schemas.microsoft.com/office/2006/metadata/properties" xmlns:xsi="http://www.w3.org/2001/XMLSchema-instance" xmlns:pc="http://schemas.microsoft.com/office/infopath/2007/PartnerControls">
+  <documentManagement>
+    <MediaServiceKeyPoints xmlns="71af3243-3dd4-4a8d-8c0d-dd76da1f02a5" xsi:nil="true"/>
+  </documentManagement>
+</p:properties>
+</file>
+
+<file path=customXml/item2.xml><?xml version="1.0" encoding="utf-8"?>
+<?mso-contentType ?>
+<FormTemplates xmlns="http://schemas.microsoft.com/sharepoint/v3/contenttype/forms">
+  <Display>DocumentLibraryForm</Display>
+  <Edit>DocumentLibraryForm</Edit>
+  <New>DocumentLibraryForm</New>
+</FormTemplates>
+</file>
+
+<file path=customXml/item3.xml><?xml version="1.0" encoding="utf-8"?>
 <ct:contentTypeSchema xmlns:ct="http://schemas.microsoft.com/office/2006/metadata/contentType" xmlns:ma="http://schemas.microsoft.com/office/2006/metadata/properties/metaAttributes" ct:_="" ma:_="" ma:contentTypeName="Document" ma:contentTypeID="0x01010079F111ED35F8CC479449609E8A0923A6" ma:contentTypeVersion="11" ma:contentTypeDescription="Create a new document." ma:contentTypeScope="" ma:versionID="9677210f24a1be23c92c90fd886aa0aa">
   <xsd:schema xmlns:xsd="http://www.w3.org/2001/XMLSchema" xmlns:xs="http://www.w3.org/2001/XMLSchema" xmlns:p="http://schemas.microsoft.com/office/2006/metadata/properties" xmlns:ns2="71af3243-3dd4-4a8d-8c0d-dd76da1f02a5" xmlns:ns3="16c05727-aa75-4e4a-9b5f-8a80a1165891" targetNamespace="http://schemas.microsoft.com/office/2006/metadata/properties" ma:root="true" ma:fieldsID="60e05723c5c1908df1a1a4ebf11d344e" ns2:_="" ns3:_="">
     <xsd:import namespace="71af3243-3dd4-4a8d-8c0d-dd76da1f02a5"/>
@@ -28824,24 +28821,25 @@
 </ct:contentTypeSchema>
 </file>
 
-<file path=customXml/item2.xml><?xml version="1.0" encoding="utf-8"?>
-<?mso-contentType ?>
-<FormTemplates xmlns="http://schemas.microsoft.com/sharepoint/v3/contenttype/forms">
-  <Display>DocumentLibraryForm</Display>
-  <Edit>DocumentLibraryForm</Edit>
-  <New>DocumentLibraryForm</New>
-</FormTemplates>
+<file path=customXml/itemProps1.xml><?xml version="1.0" encoding="utf-8"?>
+<ds:datastoreItem xmlns:ds="http://schemas.openxmlformats.org/officeDocument/2006/customXml" ds:itemID="{C9C0BFDF-D948-4F4A-854E-477525F57792}">
+  <ds:schemaRefs>
+    <ds:schemaRef ds:uri="http://schemas.microsoft.com/office/2006/metadata/properties"/>
+    <ds:schemaRef ds:uri="http://schemas.microsoft.com/office/infopath/2007/PartnerControls"/>
+    <ds:schemaRef ds:uri="71af3243-3dd4-4a8d-8c0d-dd76da1f02a5"/>
+  </ds:schemaRefs>
+</ds:datastoreItem>
 </file>
 
-<file path=customXml/item3.xml><?xml version="1.0" encoding="utf-8"?>
-<p:properties xmlns:p="http://schemas.microsoft.com/office/2006/metadata/properties" xmlns:xsi="http://www.w3.org/2001/XMLSchema-instance" xmlns:pc="http://schemas.microsoft.com/office/infopath/2007/PartnerControls">
-  <documentManagement>
-    <MediaServiceKeyPoints xmlns="71af3243-3dd4-4a8d-8c0d-dd76da1f02a5" xsi:nil="true"/>
-  </documentManagement>
-</p:properties>
+<file path=customXml/itemProps2.xml><?xml version="1.0" encoding="utf-8"?>
+<ds:datastoreItem xmlns:ds="http://schemas.openxmlformats.org/officeDocument/2006/customXml" ds:itemID="{56E3E58C-5E8A-4781-9921-C2B23BC09EB2}">
+  <ds:schemaRefs>
+    <ds:schemaRef ds:uri="http://schemas.microsoft.com/sharepoint/v3/contenttype/forms"/>
+  </ds:schemaRefs>
+</ds:datastoreItem>
 </file>
 
-<file path=customXml/itemProps1.xml><?xml version="1.0" encoding="utf-8"?>
+<file path=customXml/itemProps3.xml><?xml version="1.0" encoding="utf-8"?>
 <ds:datastoreItem xmlns:ds="http://schemas.openxmlformats.org/officeDocument/2006/customXml" ds:itemID="{513094F6-5ADD-4195-AF81-00AF033C96A1}">
   <ds:schemaRefs>
     <ds:schemaRef ds:uri="http://schemas.microsoft.com/office/2006/metadata/contentType"/>
@@ -28858,22 +28856,4 @@
     <ds:schemaRef ds:uri="http://schemas.microsoft.com/internal/obd"/>
   </ds:schemaRefs>
 </ds:datastoreItem>
-</file>
-
-<file path=customXml/itemProps2.xml><?xml version="1.0" encoding="utf-8"?>
-<ds:datastoreItem xmlns:ds="http://schemas.openxmlformats.org/officeDocument/2006/customXml" ds:itemID="{56E3E58C-5E8A-4781-9921-C2B23BC09EB2}">
-  <ds:schemaRefs>
-    <ds:schemaRef ds:uri="http://schemas.microsoft.com/sharepoint/v3/contenttype/forms"/>
-  </ds:schemaRefs>
-</ds:datastoreItem>
-</file>
-
-<file path=customXml/itemProps3.xml><?xml version="1.0" encoding="utf-8"?>
-<ds:datastoreItem xmlns:ds="http://schemas.openxmlformats.org/officeDocument/2006/customXml" ds:itemID="{C9C0BFDF-D948-4F4A-854E-477525F57792}">
-  <ds:schemaRefs>
-    <ds:schemaRef ds:uri="http://schemas.microsoft.com/office/2006/metadata/properties"/>
-    <ds:schemaRef ds:uri="http://schemas.microsoft.com/office/infopath/2007/PartnerControls"/>
-    <ds:schemaRef ds:uri="71af3243-3dd4-4a8d-8c0d-dd76da1f02a5"/>
-  </ds:schemaRefs>
-</ds:datastoreItem>
 </file>
</xml_diff>